<commit_message>
added thing to powerpoint
</commit_message>
<xml_diff>
--- a/VFAL halvtid presentation.pptx
+++ b/VFAL halvtid presentation.pptx
@@ -11,6 +11,7 @@
     <p:sldId id="259" r:id="rId5"/>
     <p:sldId id="260" r:id="rId6"/>
     <p:sldId id="261" r:id="rId7"/>
+    <p:sldId id="262" r:id="rId8"/>
   </p:sldIdLst>
   <p:sldSz cx="12192000" cy="6858000"/>
   <p:notesSz cx="6858000" cy="9144000"/>
@@ -167,7 +168,7 @@
           <a:noFill/>
           <a:extLst>
             <a:ext uri="{909E8E84-426E-40dd-AFC4-6F175D3DCCD1}">
-              <a14:hiddenFill xmlns="" xmlns:a14="http://schemas.microsoft.com/office/drawing/2010/main">
+              <a14:hiddenFill xmlns:a14="http://schemas.microsoft.com/office/drawing/2010/main" xmlns="">
                 <a:solidFill>
                   <a:srgbClr val="FFFFFF"/>
                 </a:solidFill>
@@ -227,7 +228,7 @@
             </a:ln>
             <a:extLst>
               <a:ext uri="{91240B29-F687-4f45-9708-019B960494DF}">
-                <a14:hiddenLine xmlns="" xmlns:a14="http://schemas.microsoft.com/office/drawing/2010/main" w="9525">
+                <a14:hiddenLine xmlns:a14="http://schemas.microsoft.com/office/drawing/2010/main" xmlns="" w="9525">
                   <a:solidFill>
                     <a:srgbClr val="000000"/>
                   </a:solidFill>
@@ -317,7 +318,7 @@
             </a:ln>
             <a:extLst>
               <a:ext uri="{91240B29-F687-4f45-9708-019B960494DF}">
-                <a14:hiddenLine xmlns="" xmlns:a14="http://schemas.microsoft.com/office/drawing/2010/main" w="9525">
+                <a14:hiddenLine xmlns:a14="http://schemas.microsoft.com/office/drawing/2010/main" xmlns="" w="9525">
                   <a:solidFill>
                     <a:srgbClr val="000000"/>
                   </a:solidFill>
@@ -407,7 +408,7 @@
             </a:ln>
             <a:extLst>
               <a:ext uri="{91240B29-F687-4f45-9708-019B960494DF}">
-                <a14:hiddenLine xmlns="" xmlns:a14="http://schemas.microsoft.com/office/drawing/2010/main" w="9525">
+                <a14:hiddenLine xmlns:a14="http://schemas.microsoft.com/office/drawing/2010/main" xmlns="" w="9525">
                   <a:solidFill>
                     <a:srgbClr val="000000"/>
                   </a:solidFill>
@@ -441,7 +442,7 @@
             </a:ln>
             <a:extLst>
               <a:ext uri="{91240B29-F687-4f45-9708-019B960494DF}">
-                <a14:hiddenLine xmlns="" xmlns:a14="http://schemas.microsoft.com/office/drawing/2010/main" w="9525">
+                <a14:hiddenLine xmlns:a14="http://schemas.microsoft.com/office/drawing/2010/main" xmlns="" w="9525">
                   <a:solidFill>
                     <a:srgbClr val="000000"/>
                   </a:solidFill>
@@ -531,7 +532,7 @@
             </a:ln>
             <a:extLst>
               <a:ext uri="{91240B29-F687-4f45-9708-019B960494DF}">
-                <a14:hiddenLine xmlns="" xmlns:a14="http://schemas.microsoft.com/office/drawing/2010/main" w="9525">
+                <a14:hiddenLine xmlns:a14="http://schemas.microsoft.com/office/drawing/2010/main" xmlns="" w="9525">
                   <a:solidFill>
                     <a:srgbClr val="000000"/>
                   </a:solidFill>
@@ -593,7 +594,7 @@
             </a:ln>
             <a:extLst>
               <a:ext uri="{91240B29-F687-4f45-9708-019B960494DF}">
-                <a14:hiddenLine xmlns="" xmlns:a14="http://schemas.microsoft.com/office/drawing/2010/main" w="9525">
+                <a14:hiddenLine xmlns:a14="http://schemas.microsoft.com/office/drawing/2010/main" xmlns="" w="9525">
                   <a:solidFill>
                     <a:srgbClr val="000000"/>
                   </a:solidFill>
@@ -655,7 +656,7 @@
             </a:ln>
             <a:extLst>
               <a:ext uri="{91240B29-F687-4f45-9708-019B960494DF}">
-                <a14:hiddenLine xmlns="" xmlns:a14="http://schemas.microsoft.com/office/drawing/2010/main" w="9525">
+                <a14:hiddenLine xmlns:a14="http://schemas.microsoft.com/office/drawing/2010/main" xmlns="" w="9525">
                   <a:solidFill>
                     <a:srgbClr val="000000"/>
                   </a:solidFill>
@@ -745,7 +746,7 @@
             </a:ln>
             <a:extLst>
               <a:ext uri="{91240B29-F687-4f45-9708-019B960494DF}">
-                <a14:hiddenLine xmlns="" xmlns:a14="http://schemas.microsoft.com/office/drawing/2010/main" w="9525">
+                <a14:hiddenLine xmlns:a14="http://schemas.microsoft.com/office/drawing/2010/main" xmlns="" w="9525">
                   <a:solidFill>
                     <a:srgbClr val="000000"/>
                   </a:solidFill>
@@ -807,7 +808,7 @@
             </a:ln>
             <a:extLst>
               <a:ext uri="{91240B29-F687-4f45-9708-019B960494DF}">
-                <a14:hiddenLine xmlns="" xmlns:a14="http://schemas.microsoft.com/office/drawing/2010/main" w="9525">
+                <a14:hiddenLine xmlns:a14="http://schemas.microsoft.com/office/drawing/2010/main" xmlns="" w="9525">
                   <a:solidFill>
                     <a:srgbClr val="000000"/>
                   </a:solidFill>
@@ -869,7 +870,7 @@
             </a:ln>
             <a:extLst>
               <a:ext uri="{91240B29-F687-4f45-9708-019B960494DF}">
-                <a14:hiddenLine xmlns="" xmlns:a14="http://schemas.microsoft.com/office/drawing/2010/main" w="9525">
+                <a14:hiddenLine xmlns:a14="http://schemas.microsoft.com/office/drawing/2010/main" xmlns="" w="9525">
                   <a:solidFill>
                     <a:srgbClr val="000000"/>
                   </a:solidFill>
@@ -959,7 +960,7 @@
             </a:ln>
             <a:extLst>
               <a:ext uri="{91240B29-F687-4f45-9708-019B960494DF}">
-                <a14:hiddenLine xmlns="" xmlns:a14="http://schemas.microsoft.com/office/drawing/2010/main" w="9525">
+                <a14:hiddenLine xmlns:a14="http://schemas.microsoft.com/office/drawing/2010/main" xmlns="" w="9525">
                   <a:solidFill>
                     <a:srgbClr val="000000"/>
                   </a:solidFill>
@@ -1049,7 +1050,7 @@
             </a:ln>
             <a:extLst>
               <a:ext uri="{91240B29-F687-4f45-9708-019B960494DF}">
-                <a14:hiddenLine xmlns="" xmlns:a14="http://schemas.microsoft.com/office/drawing/2010/main" w="9525">
+                <a14:hiddenLine xmlns:a14="http://schemas.microsoft.com/office/drawing/2010/main" xmlns="" w="9525">
                   <a:solidFill>
                     <a:srgbClr val="000000"/>
                   </a:solidFill>
@@ -1111,7 +1112,7 @@
             </a:ln>
             <a:extLst>
               <a:ext uri="{91240B29-F687-4f45-9708-019B960494DF}">
-                <a14:hiddenLine xmlns="" xmlns:a14="http://schemas.microsoft.com/office/drawing/2010/main" w="9525">
+                <a14:hiddenLine xmlns:a14="http://schemas.microsoft.com/office/drawing/2010/main" xmlns="" w="9525">
                   <a:solidFill>
                     <a:srgbClr val="000000"/>
                   </a:solidFill>
@@ -1221,7 +1222,7 @@
             </a:ln>
             <a:extLst>
               <a:ext uri="{91240B29-F687-4f45-9708-019B960494DF}">
-                <a14:hiddenLine xmlns="" xmlns:a14="http://schemas.microsoft.com/office/drawing/2010/main" w="9525">
+                <a14:hiddenLine xmlns:a14="http://schemas.microsoft.com/office/drawing/2010/main" xmlns="" w="9525">
                   <a:solidFill>
                     <a:srgbClr val="000000"/>
                   </a:solidFill>
@@ -1283,7 +1284,7 @@
             </a:ln>
             <a:extLst>
               <a:ext uri="{91240B29-F687-4f45-9708-019B960494DF}">
-                <a14:hiddenLine xmlns="" xmlns:a14="http://schemas.microsoft.com/office/drawing/2010/main" w="9525">
+                <a14:hiddenLine xmlns:a14="http://schemas.microsoft.com/office/drawing/2010/main" xmlns="" w="9525">
                   <a:solidFill>
                     <a:srgbClr val="000000"/>
                   </a:solidFill>
@@ -1373,7 +1374,7 @@
             </a:ln>
             <a:extLst>
               <a:ext uri="{91240B29-F687-4f45-9708-019B960494DF}">
-                <a14:hiddenLine xmlns="" xmlns:a14="http://schemas.microsoft.com/office/drawing/2010/main" w="9525">
+                <a14:hiddenLine xmlns:a14="http://schemas.microsoft.com/office/drawing/2010/main" xmlns="" w="9525">
                   <a:solidFill>
                     <a:srgbClr val="000000"/>
                   </a:solidFill>
@@ -1463,7 +1464,7 @@
             </a:ln>
             <a:extLst>
               <a:ext uri="{91240B29-F687-4f45-9708-019B960494DF}">
-                <a14:hiddenLine xmlns="" xmlns:a14="http://schemas.microsoft.com/office/drawing/2010/main" w="9525">
+                <a14:hiddenLine xmlns:a14="http://schemas.microsoft.com/office/drawing/2010/main" xmlns="" w="9525">
                   <a:solidFill>
                     <a:srgbClr val="000000"/>
                   </a:solidFill>
@@ -1525,7 +1526,7 @@
             </a:ln>
             <a:extLst>
               <a:ext uri="{91240B29-F687-4f45-9708-019B960494DF}">
-                <a14:hiddenLine xmlns="" xmlns:a14="http://schemas.microsoft.com/office/drawing/2010/main" w="9525">
+                <a14:hiddenLine xmlns:a14="http://schemas.microsoft.com/office/drawing/2010/main" xmlns="" w="9525">
                   <a:solidFill>
                     <a:srgbClr val="000000"/>
                   </a:solidFill>
@@ -1615,7 +1616,7 @@
             </a:ln>
             <a:extLst>
               <a:ext uri="{91240B29-F687-4f45-9708-019B960494DF}">
-                <a14:hiddenLine xmlns="" xmlns:a14="http://schemas.microsoft.com/office/drawing/2010/main" w="9525">
+                <a14:hiddenLine xmlns:a14="http://schemas.microsoft.com/office/drawing/2010/main" xmlns="" w="9525">
                   <a:solidFill>
                     <a:srgbClr val="000000"/>
                   </a:solidFill>
@@ -1705,7 +1706,7 @@
             </a:ln>
             <a:extLst>
               <a:ext uri="{91240B29-F687-4f45-9708-019B960494DF}">
-                <a14:hiddenLine xmlns="" xmlns:a14="http://schemas.microsoft.com/office/drawing/2010/main" w="9525">
+                <a14:hiddenLine xmlns:a14="http://schemas.microsoft.com/office/drawing/2010/main" xmlns="" w="9525">
                   <a:solidFill>
                     <a:srgbClr val="000000"/>
                   </a:solidFill>
@@ -1761,7 +1762,7 @@
             </a:ln>
             <a:extLst>
               <a:ext uri="{91240B29-F687-4f45-9708-019B960494DF}">
-                <a14:hiddenLine xmlns="" xmlns:a14="http://schemas.microsoft.com/office/drawing/2010/main" w="9525">
+                <a14:hiddenLine xmlns:a14="http://schemas.microsoft.com/office/drawing/2010/main" xmlns="" w="9525">
                   <a:solidFill>
                     <a:srgbClr val="000000"/>
                   </a:solidFill>
@@ -1851,7 +1852,7 @@
             </a:ln>
             <a:extLst>
               <a:ext uri="{91240B29-F687-4f45-9708-019B960494DF}">
-                <a14:hiddenLine xmlns="" xmlns:a14="http://schemas.microsoft.com/office/drawing/2010/main" w="9525">
+                <a14:hiddenLine xmlns:a14="http://schemas.microsoft.com/office/drawing/2010/main" xmlns="" w="9525">
                   <a:solidFill>
                     <a:srgbClr val="000000"/>
                   </a:solidFill>
@@ -1907,7 +1908,7 @@
             </a:ln>
             <a:extLst>
               <a:ext uri="{91240B29-F687-4f45-9708-019B960494DF}">
-                <a14:hiddenLine xmlns="" xmlns:a14="http://schemas.microsoft.com/office/drawing/2010/main" w="9525">
+                <a14:hiddenLine xmlns:a14="http://schemas.microsoft.com/office/drawing/2010/main" xmlns="" w="9525">
                   <a:solidFill>
                     <a:srgbClr val="000000"/>
                   </a:solidFill>
@@ -1997,7 +1998,7 @@
             </a:ln>
             <a:extLst>
               <a:ext uri="{91240B29-F687-4f45-9708-019B960494DF}">
-                <a14:hiddenLine xmlns="" xmlns:a14="http://schemas.microsoft.com/office/drawing/2010/main" w="9525">
+                <a14:hiddenLine xmlns:a14="http://schemas.microsoft.com/office/drawing/2010/main" xmlns="" w="9525">
                   <a:solidFill>
                     <a:srgbClr val="000000"/>
                   </a:solidFill>
@@ -2065,7 +2066,7 @@
             </a:ln>
             <a:extLst>
               <a:ext uri="{91240B29-F687-4f45-9708-019B960494DF}">
-                <a14:hiddenLine xmlns="" xmlns:a14="http://schemas.microsoft.com/office/drawing/2010/main" w="9525">
+                <a14:hiddenLine xmlns:a14="http://schemas.microsoft.com/office/drawing/2010/main" xmlns="" w="9525">
                   <a:solidFill>
                     <a:srgbClr val="000000"/>
                   </a:solidFill>
@@ -2155,7 +2156,7 @@
             </a:ln>
             <a:extLst>
               <a:ext uri="{91240B29-F687-4f45-9708-019B960494DF}">
-                <a14:hiddenLine xmlns="" xmlns:a14="http://schemas.microsoft.com/office/drawing/2010/main" w="9525">
+                <a14:hiddenLine xmlns:a14="http://schemas.microsoft.com/office/drawing/2010/main" xmlns="" w="9525">
                   <a:solidFill>
                     <a:srgbClr val="000000"/>
                   </a:solidFill>
@@ -2223,7 +2224,7 @@
             </a:ln>
             <a:extLst>
               <a:ext uri="{91240B29-F687-4f45-9708-019B960494DF}">
-                <a14:hiddenLine xmlns="" xmlns:a14="http://schemas.microsoft.com/office/drawing/2010/main" w="9525">
+                <a14:hiddenLine xmlns:a14="http://schemas.microsoft.com/office/drawing/2010/main" xmlns="" w="9525">
                   <a:solidFill>
                     <a:srgbClr val="000000"/>
                   </a:solidFill>
@@ -2313,7 +2314,7 @@
             </a:ln>
             <a:extLst>
               <a:ext uri="{91240B29-F687-4f45-9708-019B960494DF}">
-                <a14:hiddenLine xmlns="" xmlns:a14="http://schemas.microsoft.com/office/drawing/2010/main" w="9525">
+                <a14:hiddenLine xmlns:a14="http://schemas.microsoft.com/office/drawing/2010/main" xmlns="" w="9525">
                   <a:solidFill>
                     <a:srgbClr val="000000"/>
                   </a:solidFill>
@@ -2347,7 +2348,7 @@
             </a:ln>
             <a:extLst>
               <a:ext uri="{91240B29-F687-4f45-9708-019B960494DF}">
-                <a14:hiddenLine xmlns="" xmlns:a14="http://schemas.microsoft.com/office/drawing/2010/main" w="9525">
+                <a14:hiddenLine xmlns:a14="http://schemas.microsoft.com/office/drawing/2010/main" xmlns="" w="9525">
                   <a:solidFill>
                     <a:srgbClr val="000000"/>
                   </a:solidFill>
@@ -2437,7 +2438,7 @@
             </a:ln>
             <a:extLst>
               <a:ext uri="{91240B29-F687-4f45-9708-019B960494DF}">
-                <a14:hiddenLine xmlns="" xmlns:a14="http://schemas.microsoft.com/office/drawing/2010/main" w="9525">
+                <a14:hiddenLine xmlns:a14="http://schemas.microsoft.com/office/drawing/2010/main" xmlns="" w="9525">
                   <a:solidFill>
                     <a:srgbClr val="000000"/>
                   </a:solidFill>
@@ -2499,7 +2500,7 @@
             </a:ln>
             <a:extLst>
               <a:ext uri="{91240B29-F687-4f45-9708-019B960494DF}">
-                <a14:hiddenLine xmlns="" xmlns:a14="http://schemas.microsoft.com/office/drawing/2010/main" w="9525">
+                <a14:hiddenLine xmlns:a14="http://schemas.microsoft.com/office/drawing/2010/main" xmlns="" w="9525">
                   <a:solidFill>
                     <a:srgbClr val="000000"/>
                   </a:solidFill>
@@ -2561,7 +2562,7 @@
             </a:ln>
             <a:extLst>
               <a:ext uri="{91240B29-F687-4f45-9708-019B960494DF}">
-                <a14:hiddenLine xmlns="" xmlns:a14="http://schemas.microsoft.com/office/drawing/2010/main" w="9525">
+                <a14:hiddenLine xmlns:a14="http://schemas.microsoft.com/office/drawing/2010/main" xmlns="" w="9525">
                   <a:solidFill>
                     <a:srgbClr val="000000"/>
                   </a:solidFill>
@@ -2651,7 +2652,7 @@
             </a:ln>
             <a:extLst>
               <a:ext uri="{91240B29-F687-4f45-9708-019B960494DF}">
-                <a14:hiddenLine xmlns="" xmlns:a14="http://schemas.microsoft.com/office/drawing/2010/main" w="9525">
+                <a14:hiddenLine xmlns:a14="http://schemas.microsoft.com/office/drawing/2010/main" xmlns="" w="9525">
                   <a:solidFill>
                     <a:srgbClr val="000000"/>
                   </a:solidFill>
@@ -2719,7 +2720,7 @@
             </a:ln>
             <a:extLst>
               <a:ext uri="{91240B29-F687-4f45-9708-019B960494DF}">
-                <a14:hiddenLine xmlns="" xmlns:a14="http://schemas.microsoft.com/office/drawing/2010/main" w="9525">
+                <a14:hiddenLine xmlns:a14="http://schemas.microsoft.com/office/drawing/2010/main" xmlns="" w="9525">
                   <a:solidFill>
                     <a:srgbClr val="000000"/>
                   </a:solidFill>
@@ -2781,7 +2782,7 @@
             </a:ln>
             <a:extLst>
               <a:ext uri="{91240B29-F687-4f45-9708-019B960494DF}">
-                <a14:hiddenLine xmlns="" xmlns:a14="http://schemas.microsoft.com/office/drawing/2010/main" w="9525">
+                <a14:hiddenLine xmlns:a14="http://schemas.microsoft.com/office/drawing/2010/main" xmlns="" w="9525">
                   <a:solidFill>
                     <a:srgbClr val="000000"/>
                   </a:solidFill>
@@ -2871,7 +2872,7 @@
             </a:ln>
             <a:extLst>
               <a:ext uri="{91240B29-F687-4f45-9708-019B960494DF}">
-                <a14:hiddenLine xmlns="" xmlns:a14="http://schemas.microsoft.com/office/drawing/2010/main" w="9525">
+                <a14:hiddenLine xmlns:a14="http://schemas.microsoft.com/office/drawing/2010/main" xmlns="" w="9525">
                   <a:solidFill>
                     <a:srgbClr val="000000"/>
                   </a:solidFill>
@@ -2933,7 +2934,7 @@
             </a:ln>
             <a:extLst>
               <a:ext uri="{91240B29-F687-4f45-9708-019B960494DF}">
-                <a14:hiddenLine xmlns="" xmlns:a14="http://schemas.microsoft.com/office/drawing/2010/main" w="9525">
+                <a14:hiddenLine xmlns:a14="http://schemas.microsoft.com/office/drawing/2010/main" xmlns="" w="9525">
                   <a:solidFill>
                     <a:srgbClr val="000000"/>
                   </a:solidFill>
@@ -3023,7 +3024,7 @@
             </a:ln>
             <a:extLst>
               <a:ext uri="{91240B29-F687-4f45-9708-019B960494DF}">
-                <a14:hiddenLine xmlns="" xmlns:a14="http://schemas.microsoft.com/office/drawing/2010/main" w="9525">
+                <a14:hiddenLine xmlns:a14="http://schemas.microsoft.com/office/drawing/2010/main" xmlns="" w="9525">
                   <a:solidFill>
                     <a:srgbClr val="000000"/>
                   </a:solidFill>
@@ -3085,7 +3086,7 @@
             </a:ln>
             <a:extLst>
               <a:ext uri="{91240B29-F687-4f45-9708-019B960494DF}">
-                <a14:hiddenLine xmlns="" xmlns:a14="http://schemas.microsoft.com/office/drawing/2010/main" w="9525">
+                <a14:hiddenLine xmlns:a14="http://schemas.microsoft.com/office/drawing/2010/main" xmlns="" w="9525">
                   <a:solidFill>
                     <a:srgbClr val="000000"/>
                   </a:solidFill>
@@ -3175,7 +3176,7 @@
             </a:ln>
             <a:extLst>
               <a:ext uri="{91240B29-F687-4f45-9708-019B960494DF}">
-                <a14:hiddenLine xmlns="" xmlns:a14="http://schemas.microsoft.com/office/drawing/2010/main" w="9525">
+                <a14:hiddenLine xmlns:a14="http://schemas.microsoft.com/office/drawing/2010/main" xmlns="" w="9525">
                   <a:solidFill>
                     <a:srgbClr val="000000"/>
                   </a:solidFill>
@@ -3209,7 +3210,7 @@
             </a:ln>
             <a:extLst>
               <a:ext uri="{91240B29-F687-4f45-9708-019B960494DF}">
-                <a14:hiddenLine xmlns="" xmlns:a14="http://schemas.microsoft.com/office/drawing/2010/main" w="9525">
+                <a14:hiddenLine xmlns:a14="http://schemas.microsoft.com/office/drawing/2010/main" xmlns="" w="9525">
                   <a:solidFill>
                     <a:srgbClr val="000000"/>
                   </a:solidFill>
@@ -3274,7 +3275,7 @@
             </a:ln>
             <a:extLst>
               <a:ext uri="{91240B29-F687-4f45-9708-019B960494DF}">
-                <a14:hiddenLine xmlns="" xmlns:a14="http://schemas.microsoft.com/office/drawing/2010/main" w="9525">
+                <a14:hiddenLine xmlns:a14="http://schemas.microsoft.com/office/drawing/2010/main" xmlns="" w="9525">
                   <a:solidFill>
                     <a:srgbClr val="000000"/>
                   </a:solidFill>
@@ -3364,7 +3365,7 @@
             </a:ln>
             <a:extLst>
               <a:ext uri="{91240B29-F687-4f45-9708-019B960494DF}">
-                <a14:hiddenLine xmlns="" xmlns:a14="http://schemas.microsoft.com/office/drawing/2010/main" w="9525">
+                <a14:hiddenLine xmlns:a14="http://schemas.microsoft.com/office/drawing/2010/main" xmlns="" w="9525">
                   <a:solidFill>
                     <a:srgbClr val="000000"/>
                   </a:solidFill>
@@ -3426,7 +3427,7 @@
             </a:ln>
             <a:extLst>
               <a:ext uri="{91240B29-F687-4f45-9708-019B960494DF}">
-                <a14:hiddenLine xmlns="" xmlns:a14="http://schemas.microsoft.com/office/drawing/2010/main" w="9525">
+                <a14:hiddenLine xmlns:a14="http://schemas.microsoft.com/office/drawing/2010/main" xmlns="" w="9525">
                   <a:solidFill>
                     <a:srgbClr val="000000"/>
                   </a:solidFill>
@@ -3516,7 +3517,7 @@
             </a:ln>
             <a:extLst>
               <a:ext uri="{91240B29-F687-4f45-9708-019B960494DF}">
-                <a14:hiddenLine xmlns="" xmlns:a14="http://schemas.microsoft.com/office/drawing/2010/main" w="9525">
+                <a14:hiddenLine xmlns:a14="http://schemas.microsoft.com/office/drawing/2010/main" xmlns="" w="9525">
                   <a:solidFill>
                     <a:srgbClr val="000000"/>
                   </a:solidFill>
@@ -3606,7 +3607,7 @@
             </a:ln>
             <a:extLst>
               <a:ext uri="{91240B29-F687-4f45-9708-019B960494DF}">
-                <a14:hiddenLine xmlns="" xmlns:a14="http://schemas.microsoft.com/office/drawing/2010/main" w="9525">
+                <a14:hiddenLine xmlns:a14="http://schemas.microsoft.com/office/drawing/2010/main" xmlns="" w="9525">
                   <a:solidFill>
                     <a:srgbClr val="000000"/>
                   </a:solidFill>
@@ -3671,7 +3672,7 @@
             </a:ln>
             <a:extLst>
               <a:ext uri="{91240B29-F687-4f45-9708-019B960494DF}">
-                <a14:hiddenLine xmlns="" xmlns:a14="http://schemas.microsoft.com/office/drawing/2010/main" w="9525">
+                <a14:hiddenLine xmlns:a14="http://schemas.microsoft.com/office/drawing/2010/main" xmlns="" w="9525">
                   <a:solidFill>
                     <a:srgbClr val="000000"/>
                   </a:solidFill>
@@ -3733,7 +3734,7 @@
             </a:ln>
             <a:extLst>
               <a:ext uri="{91240B29-F687-4f45-9708-019B960494DF}">
-                <a14:hiddenLine xmlns="" xmlns:a14="http://schemas.microsoft.com/office/drawing/2010/main" w="9525">
+                <a14:hiddenLine xmlns:a14="http://schemas.microsoft.com/office/drawing/2010/main" xmlns="" w="9525">
                   <a:solidFill>
                     <a:srgbClr val="000000"/>
                   </a:solidFill>
@@ -3823,7 +3824,7 @@
             </a:ln>
             <a:extLst>
               <a:ext uri="{91240B29-F687-4f45-9708-019B960494DF}">
-                <a14:hiddenLine xmlns="" xmlns:a14="http://schemas.microsoft.com/office/drawing/2010/main" w="9525">
+                <a14:hiddenLine xmlns:a14="http://schemas.microsoft.com/office/drawing/2010/main" xmlns="" w="9525">
                   <a:solidFill>
                     <a:srgbClr val="000000"/>
                   </a:solidFill>
@@ -3913,7 +3914,7 @@
             </a:ln>
             <a:extLst>
               <a:ext uri="{91240B29-F687-4f45-9708-019B960494DF}">
-                <a14:hiddenLine xmlns="" xmlns:a14="http://schemas.microsoft.com/office/drawing/2010/main" w="9525">
+                <a14:hiddenLine xmlns:a14="http://schemas.microsoft.com/office/drawing/2010/main" xmlns="" w="9525">
                   <a:solidFill>
                     <a:srgbClr val="000000"/>
                   </a:solidFill>
@@ -3975,7 +3976,7 @@
             </a:ln>
             <a:extLst>
               <a:ext uri="{91240B29-F687-4f45-9708-019B960494DF}">
-                <a14:hiddenLine xmlns="" xmlns:a14="http://schemas.microsoft.com/office/drawing/2010/main" w="9525">
+                <a14:hiddenLine xmlns:a14="http://schemas.microsoft.com/office/drawing/2010/main" xmlns="" w="9525">
                   <a:solidFill>
                     <a:srgbClr val="000000"/>
                   </a:solidFill>
@@ -4095,7 +4096,7 @@
             </a:ln>
             <a:extLst>
               <a:ext uri="{91240B29-F687-4f45-9708-019B960494DF}">
-                <a14:hiddenLine xmlns="" xmlns:a14="http://schemas.microsoft.com/office/drawing/2010/main" w="9525">
+                <a14:hiddenLine xmlns:a14="http://schemas.microsoft.com/office/drawing/2010/main" xmlns="" w="9525">
                   <a:solidFill>
                     <a:srgbClr val="000000"/>
                   </a:solidFill>
@@ -4163,7 +4164,7 @@
             </a:ln>
             <a:extLst>
               <a:ext uri="{91240B29-F687-4f45-9708-019B960494DF}">
-                <a14:hiddenLine xmlns="" xmlns:a14="http://schemas.microsoft.com/office/drawing/2010/main" w="9525">
+                <a14:hiddenLine xmlns:a14="http://schemas.microsoft.com/office/drawing/2010/main" xmlns="" w="9525">
                   <a:solidFill>
                     <a:srgbClr val="000000"/>
                   </a:solidFill>
@@ -4253,7 +4254,7 @@
             </a:ln>
             <a:extLst>
               <a:ext uri="{91240B29-F687-4f45-9708-019B960494DF}">
-                <a14:hiddenLine xmlns="" xmlns:a14="http://schemas.microsoft.com/office/drawing/2010/main" w="9525">
+                <a14:hiddenLine xmlns:a14="http://schemas.microsoft.com/office/drawing/2010/main" xmlns="" w="9525">
                   <a:solidFill>
                     <a:srgbClr val="000000"/>
                   </a:solidFill>
@@ -8975,7 +8976,7 @@
           <a:noFill/>
           <a:extLst>
             <a:ext uri="{909E8E84-426E-40dd-AFC4-6F175D3DCCD1}">
-              <a14:hiddenFill xmlns="" xmlns:a14="http://schemas.microsoft.com/office/drawing/2010/main">
+              <a14:hiddenFill xmlns:a14="http://schemas.microsoft.com/office/drawing/2010/main" xmlns="">
                 <a:solidFill>
                   <a:srgbClr val="FFFFFF"/>
                 </a:solidFill>
@@ -9049,7 +9050,7 @@
               </a:ln>
               <a:extLst>
                 <a:ext uri="{91240B29-F687-4f45-9708-019B960494DF}">
-                  <a14:hiddenLine xmlns="" xmlns:a14="http://schemas.microsoft.com/office/drawing/2010/main" w="9525">
+                  <a14:hiddenLine xmlns:a14="http://schemas.microsoft.com/office/drawing/2010/main" xmlns="" w="9525">
                     <a:solidFill>
                       <a:srgbClr val="000000"/>
                     </a:solidFill>
@@ -9139,7 +9140,7 @@
               </a:ln>
               <a:extLst>
                 <a:ext uri="{91240B29-F687-4f45-9708-019B960494DF}">
-                  <a14:hiddenLine xmlns="" xmlns:a14="http://schemas.microsoft.com/office/drawing/2010/main" w="9525">
+                  <a14:hiddenLine xmlns:a14="http://schemas.microsoft.com/office/drawing/2010/main" xmlns="" w="9525">
                     <a:solidFill>
                       <a:srgbClr val="000000"/>
                     </a:solidFill>
@@ -9229,7 +9230,7 @@
               </a:ln>
               <a:extLst>
                 <a:ext uri="{91240B29-F687-4f45-9708-019B960494DF}">
-                  <a14:hiddenLine xmlns="" xmlns:a14="http://schemas.microsoft.com/office/drawing/2010/main" w="9525">
+                  <a14:hiddenLine xmlns:a14="http://schemas.microsoft.com/office/drawing/2010/main" xmlns="" w="9525">
                     <a:solidFill>
                       <a:srgbClr val="000000"/>
                     </a:solidFill>
@@ -9291,7 +9292,7 @@
               </a:ln>
               <a:extLst>
                 <a:ext uri="{91240B29-F687-4f45-9708-019B960494DF}">
-                  <a14:hiddenLine xmlns="" xmlns:a14="http://schemas.microsoft.com/office/drawing/2010/main" w="9525">
+                  <a14:hiddenLine xmlns:a14="http://schemas.microsoft.com/office/drawing/2010/main" xmlns="" w="9525">
                     <a:solidFill>
                       <a:srgbClr val="000000"/>
                     </a:solidFill>
@@ -9381,7 +9382,7 @@
               </a:ln>
               <a:extLst>
                 <a:ext uri="{91240B29-F687-4f45-9708-019B960494DF}">
-                  <a14:hiddenLine xmlns="" xmlns:a14="http://schemas.microsoft.com/office/drawing/2010/main" w="9525">
+                  <a14:hiddenLine xmlns:a14="http://schemas.microsoft.com/office/drawing/2010/main" xmlns="" w="9525">
                     <a:solidFill>
                       <a:srgbClr val="000000"/>
                     </a:solidFill>
@@ -9443,7 +9444,7 @@
               </a:ln>
               <a:extLst>
                 <a:ext uri="{91240B29-F687-4f45-9708-019B960494DF}">
-                  <a14:hiddenLine xmlns="" xmlns:a14="http://schemas.microsoft.com/office/drawing/2010/main" w="9525">
+                  <a14:hiddenLine xmlns:a14="http://schemas.microsoft.com/office/drawing/2010/main" xmlns="" w="9525">
                     <a:solidFill>
                       <a:srgbClr val="000000"/>
                     </a:solidFill>
@@ -9505,7 +9506,7 @@
               </a:ln>
               <a:extLst>
                 <a:ext uri="{91240B29-F687-4f45-9708-019B960494DF}">
-                  <a14:hiddenLine xmlns="" xmlns:a14="http://schemas.microsoft.com/office/drawing/2010/main" w="9525">
+                  <a14:hiddenLine xmlns:a14="http://schemas.microsoft.com/office/drawing/2010/main" xmlns="" w="9525">
                     <a:solidFill>
                       <a:srgbClr val="000000"/>
                     </a:solidFill>
@@ -9595,7 +9596,7 @@
               </a:ln>
               <a:extLst>
                 <a:ext uri="{91240B29-F687-4f45-9708-019B960494DF}">
-                  <a14:hiddenLine xmlns="" xmlns:a14="http://schemas.microsoft.com/office/drawing/2010/main" w="9525">
+                  <a14:hiddenLine xmlns:a14="http://schemas.microsoft.com/office/drawing/2010/main" xmlns="" w="9525">
                     <a:solidFill>
                       <a:srgbClr val="000000"/>
                     </a:solidFill>
@@ -9685,7 +9686,7 @@
               </a:ln>
               <a:extLst>
                 <a:ext uri="{91240B29-F687-4f45-9708-019B960494DF}">
-                  <a14:hiddenLine xmlns="" xmlns:a14="http://schemas.microsoft.com/office/drawing/2010/main" w="9525">
+                  <a14:hiddenLine xmlns:a14="http://schemas.microsoft.com/office/drawing/2010/main" xmlns="" w="9525">
                     <a:solidFill>
                       <a:srgbClr val="000000"/>
                     </a:solidFill>
@@ -9747,7 +9748,7 @@
               </a:ln>
               <a:extLst>
                 <a:ext uri="{91240B29-F687-4f45-9708-019B960494DF}">
-                  <a14:hiddenLine xmlns="" xmlns:a14="http://schemas.microsoft.com/office/drawing/2010/main" w="9525">
+                  <a14:hiddenLine xmlns:a14="http://schemas.microsoft.com/office/drawing/2010/main" xmlns="" w="9525">
                     <a:solidFill>
                       <a:srgbClr val="000000"/>
                     </a:solidFill>
@@ -9857,7 +9858,7 @@
               </a:ln>
               <a:extLst>
                 <a:ext uri="{91240B29-F687-4f45-9708-019B960494DF}">
-                  <a14:hiddenLine xmlns="" xmlns:a14="http://schemas.microsoft.com/office/drawing/2010/main" w="9525">
+                  <a14:hiddenLine xmlns:a14="http://schemas.microsoft.com/office/drawing/2010/main" xmlns="" w="9525">
                     <a:solidFill>
                       <a:srgbClr val="000000"/>
                     </a:solidFill>
@@ -9941,7 +9942,7 @@
               </a:ln>
               <a:extLst>
                 <a:ext uri="{91240B29-F687-4f45-9708-019B960494DF}">
-                  <a14:hiddenLine xmlns="" xmlns:a14="http://schemas.microsoft.com/office/drawing/2010/main" w="9525">
+                  <a14:hiddenLine xmlns:a14="http://schemas.microsoft.com/office/drawing/2010/main" xmlns="" w="9525">
                     <a:solidFill>
                       <a:srgbClr val="000000"/>
                     </a:solidFill>
@@ -10003,7 +10004,7 @@
               </a:ln>
               <a:extLst>
                 <a:ext uri="{91240B29-F687-4f45-9708-019B960494DF}">
-                  <a14:hiddenLine xmlns="" xmlns:a14="http://schemas.microsoft.com/office/drawing/2010/main" w="9525">
+                  <a14:hiddenLine xmlns:a14="http://schemas.microsoft.com/office/drawing/2010/main" xmlns="" w="9525">
                     <a:solidFill>
                       <a:srgbClr val="000000"/>
                     </a:solidFill>
@@ -10065,7 +10066,7 @@
               </a:ln>
               <a:extLst>
                 <a:ext uri="{91240B29-F687-4f45-9708-019B960494DF}">
-                  <a14:hiddenLine xmlns="" xmlns:a14="http://schemas.microsoft.com/office/drawing/2010/main" w="9525">
+                  <a14:hiddenLine xmlns:a14="http://schemas.microsoft.com/office/drawing/2010/main" xmlns="" w="9525">
                     <a:solidFill>
                       <a:srgbClr val="000000"/>
                     </a:solidFill>
@@ -10155,7 +10156,7 @@
               </a:ln>
               <a:extLst>
                 <a:ext uri="{91240B29-F687-4f45-9708-019B960494DF}">
-                  <a14:hiddenLine xmlns="" xmlns:a14="http://schemas.microsoft.com/office/drawing/2010/main" w="9525">
+                  <a14:hiddenLine xmlns:a14="http://schemas.microsoft.com/office/drawing/2010/main" xmlns="" w="9525">
                     <a:solidFill>
                       <a:srgbClr val="000000"/>
                     </a:solidFill>
@@ -10189,7 +10190,7 @@
               </a:ln>
               <a:extLst>
                 <a:ext uri="{91240B29-F687-4f45-9708-019B960494DF}">
-                  <a14:hiddenLine xmlns="" xmlns:a14="http://schemas.microsoft.com/office/drawing/2010/main" w="9525">
+                  <a14:hiddenLine xmlns:a14="http://schemas.microsoft.com/office/drawing/2010/main" xmlns="" w="9525">
                     <a:solidFill>
                       <a:srgbClr val="000000"/>
                     </a:solidFill>
@@ -10254,7 +10255,7 @@
               </a:ln>
               <a:extLst>
                 <a:ext uri="{91240B29-F687-4f45-9708-019B960494DF}">
-                  <a14:hiddenLine xmlns="" xmlns:a14="http://schemas.microsoft.com/office/drawing/2010/main" w="9525">
+                  <a14:hiddenLine xmlns:a14="http://schemas.microsoft.com/office/drawing/2010/main" xmlns="" w="9525">
                     <a:solidFill>
                       <a:srgbClr val="000000"/>
                     </a:solidFill>
@@ -10344,7 +10345,7 @@
               </a:ln>
               <a:extLst>
                 <a:ext uri="{91240B29-F687-4f45-9708-019B960494DF}">
-                  <a14:hiddenLine xmlns="" xmlns:a14="http://schemas.microsoft.com/office/drawing/2010/main" w="9525">
+                  <a14:hiddenLine xmlns:a14="http://schemas.microsoft.com/office/drawing/2010/main" xmlns="" w="9525">
                     <a:solidFill>
                       <a:srgbClr val="000000"/>
                     </a:solidFill>
@@ -10406,7 +10407,7 @@
               </a:ln>
               <a:extLst>
                 <a:ext uri="{91240B29-F687-4f45-9708-019B960494DF}">
-                  <a14:hiddenLine xmlns="" xmlns:a14="http://schemas.microsoft.com/office/drawing/2010/main" w="9525">
+                  <a14:hiddenLine xmlns:a14="http://schemas.microsoft.com/office/drawing/2010/main" xmlns="" w="9525">
                     <a:solidFill>
                       <a:srgbClr val="000000"/>
                     </a:solidFill>
@@ -10496,7 +10497,7 @@
               </a:ln>
               <a:extLst>
                 <a:ext uri="{91240B29-F687-4f45-9708-019B960494DF}">
-                  <a14:hiddenLine xmlns="" xmlns:a14="http://schemas.microsoft.com/office/drawing/2010/main" w="9525">
+                  <a14:hiddenLine xmlns:a14="http://schemas.microsoft.com/office/drawing/2010/main" xmlns="" w="9525">
                     <a:solidFill>
                       <a:srgbClr val="000000"/>
                     </a:solidFill>
@@ -10561,7 +10562,7 @@
               </a:ln>
               <a:extLst>
                 <a:ext uri="{91240B29-F687-4f45-9708-019B960494DF}">
-                  <a14:hiddenLine xmlns="" xmlns:a14="http://schemas.microsoft.com/office/drawing/2010/main" w="9525">
+                  <a14:hiddenLine xmlns:a14="http://schemas.microsoft.com/office/drawing/2010/main" xmlns="" w="9525">
                     <a:solidFill>
                       <a:srgbClr val="000000"/>
                     </a:solidFill>
@@ -10623,7 +10624,7 @@
               </a:ln>
               <a:extLst>
                 <a:ext uri="{91240B29-F687-4f45-9708-019B960494DF}">
-                  <a14:hiddenLine xmlns="" xmlns:a14="http://schemas.microsoft.com/office/drawing/2010/main" w="9525">
+                  <a14:hiddenLine xmlns:a14="http://schemas.microsoft.com/office/drawing/2010/main" xmlns="" w="9525">
                     <a:solidFill>
                       <a:srgbClr val="000000"/>
                     </a:solidFill>
@@ -10713,7 +10714,7 @@
               </a:ln>
               <a:extLst>
                 <a:ext uri="{91240B29-F687-4f45-9708-019B960494DF}">
-                  <a14:hiddenLine xmlns="" xmlns:a14="http://schemas.microsoft.com/office/drawing/2010/main" w="9525">
+                  <a14:hiddenLine xmlns:a14="http://schemas.microsoft.com/office/drawing/2010/main" xmlns="" w="9525">
                     <a:solidFill>
                       <a:srgbClr val="000000"/>
                     </a:solidFill>
@@ -10803,7 +10804,7 @@
               </a:ln>
               <a:extLst>
                 <a:ext uri="{91240B29-F687-4f45-9708-019B960494DF}">
-                  <a14:hiddenLine xmlns="" xmlns:a14="http://schemas.microsoft.com/office/drawing/2010/main" w="9525">
+                  <a14:hiddenLine xmlns:a14="http://schemas.microsoft.com/office/drawing/2010/main" xmlns="" w="9525">
                     <a:solidFill>
                       <a:srgbClr val="000000"/>
                     </a:solidFill>
@@ -10868,7 +10869,7 @@
               </a:ln>
               <a:extLst>
                 <a:ext uri="{91240B29-F687-4f45-9708-019B960494DF}">
-                  <a14:hiddenLine xmlns="" xmlns:a14="http://schemas.microsoft.com/office/drawing/2010/main" w="9525">
+                  <a14:hiddenLine xmlns:a14="http://schemas.microsoft.com/office/drawing/2010/main" xmlns="" w="9525">
                     <a:solidFill>
                       <a:srgbClr val="000000"/>
                     </a:solidFill>
@@ -10988,7 +10989,7 @@
               </a:ln>
               <a:extLst>
                 <a:ext uri="{91240B29-F687-4f45-9708-019B960494DF}">
-                  <a14:hiddenLine xmlns="" xmlns:a14="http://schemas.microsoft.com/office/drawing/2010/main" w="9525">
+                  <a14:hiddenLine xmlns:a14="http://schemas.microsoft.com/office/drawing/2010/main" xmlns="" w="9525">
                     <a:solidFill>
                       <a:srgbClr val="000000"/>
                     </a:solidFill>
@@ -11086,7 +11087,7 @@
               </a:ln>
               <a:extLst>
                 <a:ext uri="{91240B29-F687-4f45-9708-019B960494DF}">
-                  <a14:hiddenLine xmlns="" xmlns:a14="http://schemas.microsoft.com/office/drawing/2010/main" w="9525">
+                  <a14:hiddenLine xmlns:a14="http://schemas.microsoft.com/office/drawing/2010/main" xmlns="" w="9525">
                     <a:solidFill>
                       <a:srgbClr val="000000"/>
                     </a:solidFill>
@@ -11201,7 +11202,7 @@
               </a:ln>
               <a:extLst>
                 <a:ext uri="{91240B29-F687-4f45-9708-019B960494DF}">
-                  <a14:hiddenLine xmlns="" xmlns:a14="http://schemas.microsoft.com/office/drawing/2010/main" w="9525">
+                  <a14:hiddenLine xmlns:a14="http://schemas.microsoft.com/office/drawing/2010/main" xmlns="" w="9525">
                     <a:solidFill>
                       <a:srgbClr val="000000"/>
                     </a:solidFill>
@@ -11291,7 +11292,7 @@
               </a:ln>
               <a:extLst>
                 <a:ext uri="{91240B29-F687-4f45-9708-019B960494DF}">
-                  <a14:hiddenLine xmlns="" xmlns:a14="http://schemas.microsoft.com/office/drawing/2010/main" w="9525">
+                  <a14:hiddenLine xmlns:a14="http://schemas.microsoft.com/office/drawing/2010/main" xmlns="" w="9525">
                     <a:solidFill>
                       <a:srgbClr val="000000"/>
                     </a:solidFill>
@@ -11356,7 +11357,7 @@
               </a:ln>
               <a:extLst>
                 <a:ext uri="{91240B29-F687-4f45-9708-019B960494DF}">
-                  <a14:hiddenLine xmlns="" xmlns:a14="http://schemas.microsoft.com/office/drawing/2010/main" w="9525">
+                  <a14:hiddenLine xmlns:a14="http://schemas.microsoft.com/office/drawing/2010/main" xmlns="" w="9525">
                     <a:solidFill>
                       <a:srgbClr val="000000"/>
                     </a:solidFill>
@@ -11446,7 +11447,7 @@
               </a:ln>
               <a:extLst>
                 <a:ext uri="{91240B29-F687-4f45-9708-019B960494DF}">
-                  <a14:hiddenLine xmlns="" xmlns:a14="http://schemas.microsoft.com/office/drawing/2010/main" w="9525">
+                  <a14:hiddenLine xmlns:a14="http://schemas.microsoft.com/office/drawing/2010/main" xmlns="" w="9525">
                     <a:solidFill>
                       <a:srgbClr val="000000"/>
                     </a:solidFill>
@@ -11514,7 +11515,7 @@
               </a:ln>
               <a:extLst>
                 <a:ext uri="{91240B29-F687-4f45-9708-019B960494DF}">
-                  <a14:hiddenLine xmlns="" xmlns:a14="http://schemas.microsoft.com/office/drawing/2010/main" w="9525">
+                  <a14:hiddenLine xmlns:a14="http://schemas.microsoft.com/office/drawing/2010/main" xmlns="" w="9525">
                     <a:solidFill>
                       <a:srgbClr val="000000"/>
                     </a:solidFill>
@@ -11604,7 +11605,7 @@
               </a:ln>
               <a:extLst>
                 <a:ext uri="{91240B29-F687-4f45-9708-019B960494DF}">
-                  <a14:hiddenLine xmlns="" xmlns:a14="http://schemas.microsoft.com/office/drawing/2010/main" w="9525">
+                  <a14:hiddenLine xmlns:a14="http://schemas.microsoft.com/office/drawing/2010/main" xmlns="" w="9525">
                     <a:solidFill>
                       <a:srgbClr val="000000"/>
                     </a:solidFill>
@@ -11672,7 +11673,7 @@
               </a:ln>
               <a:extLst>
                 <a:ext uri="{91240B29-F687-4f45-9708-019B960494DF}">
-                  <a14:hiddenLine xmlns="" xmlns:a14="http://schemas.microsoft.com/office/drawing/2010/main" w="9525">
+                  <a14:hiddenLine xmlns:a14="http://schemas.microsoft.com/office/drawing/2010/main" xmlns="" w="9525">
                     <a:solidFill>
                       <a:srgbClr val="000000"/>
                     </a:solidFill>
@@ -11762,7 +11763,7 @@
               </a:ln>
               <a:extLst>
                 <a:ext uri="{91240B29-F687-4f45-9708-019B960494DF}">
-                  <a14:hiddenLine xmlns="" xmlns:a14="http://schemas.microsoft.com/office/drawing/2010/main" w="9525">
+                  <a14:hiddenLine xmlns:a14="http://schemas.microsoft.com/office/drawing/2010/main" xmlns="" w="9525">
                     <a:solidFill>
                       <a:srgbClr val="000000"/>
                     </a:solidFill>
@@ -11796,7 +11797,7 @@
               </a:ln>
               <a:extLst>
                 <a:ext uri="{91240B29-F687-4f45-9708-019B960494DF}">
-                  <a14:hiddenLine xmlns="" xmlns:a14="http://schemas.microsoft.com/office/drawing/2010/main" w="9525">
+                  <a14:hiddenLine xmlns:a14="http://schemas.microsoft.com/office/drawing/2010/main" xmlns="" w="9525">
                     <a:solidFill>
                       <a:srgbClr val="000000"/>
                     </a:solidFill>
@@ -13390,7 +13391,19 @@
           <a:bodyPr/>
           <a:lstStyle/>
           <a:p>
-            <a:endParaRPr lang="sv-SE"/>
+            <a:r>
+              <a:rPr lang="en-GB" dirty="0"/>
+              <a:t>Subscription</a:t>
+            </a:r>
+            <a:r>
+              <a:rPr lang="sv-SE" dirty="0"/>
+              <a:t> </a:t>
+            </a:r>
+            <a:r>
+              <a:rPr lang="en-GB" dirty="0"/>
+              <a:t>issue:</a:t>
+            </a:r>
+            <a:endParaRPr lang="sv-SE" dirty="0"/>
           </a:p>
         </p:txBody>
       </p:sp>
@@ -13415,7 +13428,70 @@
           <a:bodyPr/>
           <a:lstStyle/>
           <a:p>
-            <a:endParaRPr lang="sv-SE"/>
+            <a:pPr marL="342900" indent="-342900" fontAlgn="ctr"/>
+            <a:r>
+              <a:rPr lang="en-GB" i="1" dirty="0"/>
+              <a:t>Due to </a:t>
+            </a:r>
+            <a:r>
+              <a:rPr lang="en-GB" dirty="0"/>
+              <a:t>=&gt; Asynchronous Http Calls Angular 5 not waiting for response</a:t>
+            </a:r>
+          </a:p>
+          <a:p>
+            <a:pPr marL="342900" indent="-342900" fontAlgn="ctr"/>
+            <a:r>
+              <a:rPr lang="en-GB" i="1" dirty="0"/>
+              <a:t>Current solution </a:t>
+            </a:r>
+            <a:r>
+              <a:rPr lang="en-GB" dirty="0"/>
+              <a:t>=&gt; Angular is waiting in the ‘get call handle’ and we are transforming the data there, and other more "ad hoc" solutions</a:t>
+            </a:r>
+          </a:p>
+          <a:p>
+            <a:pPr marL="342900" indent="-342900" fontAlgn="ctr"/>
+            <a:r>
+              <a:rPr lang="en-GB" i="1" dirty="0"/>
+              <a:t>Solution =&gt;</a:t>
+            </a:r>
+            <a:r>
+              <a:rPr lang="en-GB" dirty="0"/>
+              <a:t> Ex. using </a:t>
+            </a:r>
+            <a:r>
+              <a:rPr lang="en-GB" dirty="0" err="1"/>
+              <a:t>RxJS</a:t>
+            </a:r>
+            <a:r>
+              <a:rPr lang="en-GB" dirty="0"/>
+              <a:t> pipes and mapping</a:t>
+            </a:r>
+            <a:br>
+              <a:rPr lang="en-GB" dirty="0"/>
+            </a:br>
+            <a:r>
+              <a:rPr lang="en-GB" dirty="0"/>
+              <a:t>=&gt; </a:t>
+            </a:r>
+            <a:r>
+              <a:rPr lang="en-GB" i="1" dirty="0"/>
+              <a:t>so far too complicated for us</a:t>
+            </a:r>
+          </a:p>
+          <a:p>
+            <a:pPr marL="342900" indent="-342900" fontAlgn="ctr"/>
+            <a:r>
+              <a:rPr lang="en-GB" i="1" dirty="0"/>
+              <a:t>Also =&gt; </a:t>
+            </a:r>
+            <a:r>
+              <a:rPr lang="en-GB" dirty="0"/>
+              <a:t>Solve/manage by changing APIs, page and ‘get call’ design</a:t>
+            </a:r>
+          </a:p>
+          <a:p>
+            <a:endParaRPr lang="sv-SE" dirty="0"/>
           </a:p>
         </p:txBody>
       </p:sp>
@@ -13423,6 +13499,183 @@
     <p:extLst>
       <p:ext uri="{BB962C8B-B14F-4D97-AF65-F5344CB8AC3E}">
         <p14:creationId xmlns:p14="http://schemas.microsoft.com/office/powerpoint/2010/main" val="3825015563"/>
+      </p:ext>
+    </p:extLst>
+  </p:cSld>
+  <p:clrMapOvr>
+    <a:masterClrMapping/>
+  </p:clrMapOvr>
+</p:sld>
+</file>
+
+<file path=ppt/slides/slide7.xml><?xml version="1.0" encoding="utf-8"?>
+<p:sld xmlns:a="http://schemas.openxmlformats.org/drawingml/2006/main" xmlns:r="http://schemas.openxmlformats.org/officeDocument/2006/relationships" xmlns:p="http://schemas.openxmlformats.org/presentationml/2006/main">
+  <p:cSld>
+    <p:spTree>
+      <p:nvGrpSpPr>
+        <p:cNvPr id="1" name=""/>
+        <p:cNvGrpSpPr/>
+        <p:nvPr/>
+      </p:nvGrpSpPr>
+      <p:grpSpPr>
+        <a:xfrm>
+          <a:off x="0" y="0"/>
+          <a:ext cx="0" cy="0"/>
+          <a:chOff x="0" y="0"/>
+          <a:chExt cx="0" cy="0"/>
+        </a:xfrm>
+      </p:grpSpPr>
+      <p:sp>
+        <p:nvSpPr>
+          <p:cNvPr id="2" name="Rubrik 1">
+            <a:extLst>
+              <a:ext uri="{FF2B5EF4-FFF2-40B4-BE49-F238E27FC236}">
+                <a16:creationId xmlns:a16="http://schemas.microsoft.com/office/drawing/2014/main" id="{F04648C5-2912-4E4E-A133-96C77B64C075}"/>
+              </a:ext>
+            </a:extLst>
+          </p:cNvPr>
+          <p:cNvSpPr>
+            <a:spLocks noGrp="1"/>
+          </p:cNvSpPr>
+          <p:nvPr>
+            <p:ph type="title"/>
+          </p:nvPr>
+        </p:nvSpPr>
+        <p:spPr/>
+        <p:txBody>
+          <a:bodyPr/>
+          <a:lstStyle/>
+          <a:p>
+            <a:r>
+              <a:rPr lang="en-GB" dirty="0"/>
+              <a:t>Issue</a:t>
+            </a:r>
+            <a:r>
+              <a:rPr lang="sv-SE" dirty="0"/>
+              <a:t> </a:t>
+            </a:r>
+            <a:r>
+              <a:rPr lang="sv-SE" dirty="0" err="1"/>
+              <a:t>with</a:t>
+            </a:r>
+            <a:r>
+              <a:rPr lang="sv-SE" dirty="0"/>
+              <a:t> </a:t>
+            </a:r>
+            <a:r>
+              <a:rPr lang="sv-SE" dirty="0" err="1"/>
+              <a:t>lazy</a:t>
+            </a:r>
+            <a:r>
+              <a:rPr lang="sv-SE" dirty="0"/>
+              <a:t> </a:t>
+            </a:r>
+            <a:r>
+              <a:rPr lang="sv-SE" dirty="0" err="1"/>
+              <a:t>loading</a:t>
+            </a:r>
+            <a:r>
+              <a:rPr lang="en-GB" dirty="0"/>
+              <a:t>:</a:t>
+            </a:r>
+          </a:p>
+        </p:txBody>
+      </p:sp>
+      <p:sp>
+        <p:nvSpPr>
+          <p:cNvPr id="3" name="Platshållare för innehåll 2">
+            <a:extLst>
+              <a:ext uri="{FF2B5EF4-FFF2-40B4-BE49-F238E27FC236}">
+                <a16:creationId xmlns:a16="http://schemas.microsoft.com/office/drawing/2014/main" id="{86917C40-60D7-452E-A98E-E70D99D1FE88}"/>
+              </a:ext>
+            </a:extLst>
+          </p:cNvPr>
+          <p:cNvSpPr>
+            <a:spLocks noGrp="1"/>
+          </p:cNvSpPr>
+          <p:nvPr>
+            <p:ph idx="1"/>
+          </p:nvPr>
+        </p:nvSpPr>
+        <p:spPr>
+          <a:xfrm>
+            <a:off x="1141412" y="2249486"/>
+            <a:ext cx="9905999" cy="3721467"/>
+          </a:xfrm>
+        </p:spPr>
+        <p:txBody>
+          <a:bodyPr>
+            <a:normAutofit/>
+          </a:bodyPr>
+          <a:lstStyle/>
+          <a:p>
+            <a:pPr marL="342900" indent="-342900" fontAlgn="ctr"/>
+            <a:r>
+              <a:rPr lang="en-GB" dirty="0"/>
+              <a:t>Bug in Angular 5?</a:t>
+            </a:r>
+          </a:p>
+          <a:p>
+            <a:pPr marL="342900" indent="-342900" fontAlgn="ctr"/>
+            <a:r>
+              <a:rPr lang="en-GB" dirty="0"/>
+              <a:t>Documentation lacking in general..</a:t>
+            </a:r>
+          </a:p>
+          <a:p>
+            <a:pPr marL="342900" indent="-342900" fontAlgn="ctr"/>
+            <a:r>
+              <a:rPr lang="en-GB" i="1" dirty="0"/>
+              <a:t>Lazy loading </a:t>
+            </a:r>
+            <a:r>
+              <a:rPr lang="en-GB" dirty="0"/>
+              <a:t>=&gt; Boost performance not loading everything at once. </a:t>
+            </a:r>
+          </a:p>
+          <a:p>
+            <a:pPr marL="342900" indent="-342900" fontAlgn="ctr"/>
+            <a:r>
+              <a:rPr lang="en-GB" i="1" dirty="0"/>
+              <a:t>Problem with =&gt; </a:t>
+            </a:r>
+            <a:r>
+              <a:rPr lang="en-GB" dirty="0"/>
+              <a:t>Routing to child modules</a:t>
+            </a:r>
+          </a:p>
+          <a:p>
+            <a:pPr marL="342900" indent="-342900" fontAlgn="ctr"/>
+            <a:r>
+              <a:rPr lang="en-GB" i="1" dirty="0"/>
+              <a:t>Management =&gt;</a:t>
+            </a:r>
+            <a:r>
+              <a:rPr lang="en-GB" dirty="0"/>
+              <a:t> implementing a semi – solution, not working with scale up.</a:t>
+            </a:r>
+            <a:endParaRPr lang="en-GB" i="1" dirty="0"/>
+          </a:p>
+          <a:p>
+            <a:pPr marL="342900" indent="-342900" fontAlgn="ctr"/>
+            <a:r>
+              <a:rPr lang="en-GB" i="1" dirty="0"/>
+              <a:t>Solution =&gt; </a:t>
+            </a:r>
+            <a:r>
+              <a:rPr lang="en-GB" dirty="0"/>
+              <a:t>Not implementing but we have to change file structure for this</a:t>
+            </a:r>
+          </a:p>
+          <a:p>
+            <a:endParaRPr lang="en-GB" dirty="0"/>
+          </a:p>
+        </p:txBody>
+      </p:sp>
+    </p:spTree>
+    <p:extLst>
+      <p:ext uri="{BB962C8B-B14F-4D97-AF65-F5344CB8AC3E}">
+        <p14:creationId xmlns:p14="http://schemas.microsoft.com/office/powerpoint/2010/main" val="2254251386"/>
       </p:ext>
     </p:extLst>
   </p:cSld>

</xml_diff>